<commit_message>
add all ppt and code
</commit_message>
<xml_diff>
--- a/ppt/4.5-类的属性访问.pptx
+++ b/ppt/4.5-类的属性访问.pptx
@@ -227,6 +227,7 @@
   <p:cSld>
     <p:bg>
       <p:bgPr>
+        <a:noFill/>
         <a:effectLst/>
       </p:bgPr>
     </p:bg>
@@ -4810,12 +4811,12 @@
                 <a:cs typeface="Courier New"/>
                 <a:sym typeface="Courier New"/>
               </a:rPr>
-              <a:t>    self.name </a:t>
+              <a:t>    </a:t>
             </a:r>
             <a:r>
-              <a:rPr lang="en-GB" sz="1500">
+              <a:rPr lang="en-US" altLang="en-GB" sz="1500">
                 <a:solidFill>
-                  <a:srgbClr val="FF5600"/>
+                  <a:schemeClr val="dk1"/>
                 </a:solidFill>
                 <a:highlight>
                   <a:srgbClr val="FFFFFF"/>
@@ -4825,7 +4826,82 @@
                 <a:cs typeface="Courier New"/>
                 <a:sym typeface="Courier New"/>
               </a:rPr>
-              <a:t>=</a:t>
+              <a:t>setattr</a:t>
+            </a:r>
+            <a:r>
+              <a:rPr lang="en-US" altLang="en-GB" sz="1500">
+                <a:solidFill>
+                  <a:schemeClr val="dk1"/>
+                </a:solidFill>
+                <a:highlight>
+                  <a:srgbClr val="FFFFFF"/>
+                </a:highlight>
+                <a:latin typeface="Courier New"/>
+                <a:ea typeface="Courier New"/>
+                <a:cs typeface="Courier New"/>
+                <a:sym typeface="Courier New"/>
+              </a:rPr>
+              <a:t>(</a:t>
+            </a:r>
+            <a:r>
+              <a:rPr lang="en-GB" sz="1500">
+                <a:solidFill>
+                  <a:schemeClr val="dk1"/>
+                </a:solidFill>
+                <a:highlight>
+                  <a:srgbClr val="FFFFFF"/>
+                </a:highlight>
+                <a:latin typeface="Courier New"/>
+                <a:ea typeface="Courier New"/>
+                <a:cs typeface="Courier New"/>
+                <a:sym typeface="Courier New"/>
+              </a:rPr>
+              <a:t>self</a:t>
+            </a:r>
+            <a:r>
+              <a:rPr lang="en-US" altLang="en-GB" sz="1500">
+                <a:solidFill>
+                  <a:schemeClr val="dk1"/>
+                </a:solidFill>
+                <a:highlight>
+                  <a:srgbClr val="FFFFFF"/>
+                </a:highlight>
+                <a:latin typeface="Courier New"/>
+                <a:ea typeface="Courier New"/>
+                <a:cs typeface="Courier New"/>
+                <a:sym typeface="Courier New"/>
+              </a:rPr>
+              <a:t>, </a:t>
+            </a:r>
+            <a:r>
+              <a:rPr lang="en-GB" sz="1500">
+                <a:solidFill>
+                  <a:schemeClr val="dk1"/>
+                </a:solidFill>
+                <a:highlight>
+                  <a:srgbClr val="FFFFFF"/>
+                </a:highlight>
+                <a:latin typeface="Courier New"/>
+                <a:ea typeface="Courier New"/>
+                <a:cs typeface="Courier New"/>
+                <a:sym typeface="Courier New"/>
+              </a:rPr>
+              <a:t>name</a:t>
+            </a:r>
+            <a:r>
+              <a:rPr lang="en-US" altLang="en-GB" sz="1500">
+                <a:solidFill>
+                  <a:schemeClr val="dk1"/>
+                </a:solidFill>
+                <a:highlight>
+                  <a:srgbClr val="FFFFFF"/>
+                </a:highlight>
+                <a:latin typeface="Courier New"/>
+                <a:ea typeface="Courier New"/>
+                <a:cs typeface="Courier New"/>
+                <a:sym typeface="Courier New"/>
+              </a:rPr>
+              <a:t>,</a:t>
             </a:r>
             <a:r>
               <a:rPr lang="en-GB" sz="1500">
@@ -4841,6 +4917,21 @@
                 <a:sym typeface="Courier New"/>
               </a:rPr>
               <a:t> value</a:t>
+            </a:r>
+            <a:r>
+              <a:rPr lang="en-US" altLang="en-GB" sz="1500">
+                <a:solidFill>
+                  <a:schemeClr val="dk1"/>
+                </a:solidFill>
+                <a:highlight>
+                  <a:srgbClr val="FFFFFF"/>
+                </a:highlight>
+                <a:latin typeface="Courier New"/>
+                <a:ea typeface="Courier New"/>
+                <a:cs typeface="Courier New"/>
+                <a:sym typeface="Courier New"/>
+              </a:rPr>
+              <a:t>)</a:t>
             </a:r>
             <a:br>
               <a:rPr lang="en-GB" sz="1500">

</xml_diff>